<commit_message>
Corrected broken screenshot link
</commit_message>
<xml_diff>
--- a/img/diagrams.pptx
+++ b/img/diagrams.pptx
@@ -5,11 +5,10 @@
     <p:sldMasterId id="2147483648" r:id="rId1"/>
   </p:sldMasterIdLst>
   <p:notesMasterIdLst>
-    <p:notesMasterId r:id="rId4"/>
+    <p:notesMasterId r:id="rId3"/>
   </p:notesMasterIdLst>
   <p:sldIdLst>
-    <p:sldId id="256" r:id="rId2"/>
-    <p:sldId id="257" r:id="rId3"/>
+    <p:sldId id="257" r:id="rId2"/>
   </p:sldIdLst>
   <p:sldSz cx="12192000" cy="6858000"/>
   <p:notesSz cx="6858000" cy="9144000"/>
@@ -526,90 +525,6 @@
             <a:fld id="{B0C41C29-D1CB-4B6B-B878-7CB112308D50}" type="slidenum">
               <a:rPr lang="en-US" smtClean="0"/>
               <a:t>1</a:t>
-            </a:fld>
-            <a:endParaRPr lang="en-US"/>
-          </a:p>
-        </p:txBody>
-      </p:sp>
-    </p:spTree>
-    <p:extLst>
-      <p:ext uri="{BB962C8B-B14F-4D97-AF65-F5344CB8AC3E}">
-        <p14:creationId xmlns:p14="http://schemas.microsoft.com/office/powerpoint/2010/main" val="1989991208"/>
-      </p:ext>
-    </p:extLst>
-  </p:cSld>
-  <p:clrMapOvr>
-    <a:masterClrMapping/>
-  </p:clrMapOvr>
-</p:notes>
-</file>
-
-<file path=ppt/notesSlides/notesSlide2.xml><?xml version="1.0" encoding="utf-8"?>
-<p:notes xmlns:a="http://schemas.openxmlformats.org/drawingml/2006/main" xmlns:r="http://schemas.openxmlformats.org/officeDocument/2006/relationships" xmlns:p="http://schemas.openxmlformats.org/presentationml/2006/main">
-  <p:cSld>
-    <p:spTree>
-      <p:nvGrpSpPr>
-        <p:cNvPr id="1" name=""/>
-        <p:cNvGrpSpPr/>
-        <p:nvPr/>
-      </p:nvGrpSpPr>
-      <p:grpSpPr>
-        <a:xfrm>
-          <a:off x="0" y="0"/>
-          <a:ext cx="0" cy="0"/>
-          <a:chOff x="0" y="0"/>
-          <a:chExt cx="0" cy="0"/>
-        </a:xfrm>
-      </p:grpSpPr>
-      <p:sp>
-        <p:nvSpPr>
-          <p:cNvPr id="2" name="Slide Image Placeholder 1"/>
-          <p:cNvSpPr>
-            <a:spLocks noGrp="1" noRot="1" noChangeAspect="1"/>
-          </p:cNvSpPr>
-          <p:nvPr>
-            <p:ph type="sldImg"/>
-          </p:nvPr>
-        </p:nvSpPr>
-        <p:spPr/>
-      </p:sp>
-      <p:sp>
-        <p:nvSpPr>
-          <p:cNvPr id="3" name="Notes Placeholder 2"/>
-          <p:cNvSpPr>
-            <a:spLocks noGrp="1"/>
-          </p:cNvSpPr>
-          <p:nvPr>
-            <p:ph type="body" idx="1"/>
-          </p:nvPr>
-        </p:nvSpPr>
-        <p:spPr/>
-        <p:txBody>
-          <a:bodyPr/>
-          <a:lstStyle/>
-          <a:p>
-            <a:endParaRPr lang="en-US"/>
-          </a:p>
-        </p:txBody>
-      </p:sp>
-      <p:sp>
-        <p:nvSpPr>
-          <p:cNvPr id="4" name="Slide Number Placeholder 3"/>
-          <p:cNvSpPr>
-            <a:spLocks noGrp="1"/>
-          </p:cNvSpPr>
-          <p:nvPr>
-            <p:ph type="sldNum" sz="quarter" idx="10"/>
-          </p:nvPr>
-        </p:nvSpPr>
-        <p:spPr/>
-        <p:txBody>
-          <a:bodyPr/>
-          <a:lstStyle/>
-          <a:p>
-            <a:fld id="{B0C41C29-D1CB-4B6B-B878-7CB112308D50}" type="slidenum">
-              <a:rPr lang="en-US" smtClean="0"/>
-              <a:t>2</a:t>
             </a:fld>
             <a:endParaRPr lang="en-US"/>
           </a:p>
@@ -16302,86 +16217,6 @@
           <a:chExt cx="0" cy="0"/>
         </a:xfrm>
       </p:grpSpPr>
-      <p:sp>
-        <p:nvSpPr>
-          <p:cNvPr id="2" name="Title 1">
-            <a:extLst>
-              <a:ext uri="{FF2B5EF4-FFF2-40B4-BE49-F238E27FC236}">
-                <a16:creationId xmlns:a16="http://schemas.microsoft.com/office/drawing/2014/main" id="{A6354972-B706-4D41-AFDF-FCBE0E9F6763}"/>
-              </a:ext>
-            </a:extLst>
-          </p:cNvPr>
-          <p:cNvSpPr>
-            <a:spLocks noGrp="1"/>
-          </p:cNvSpPr>
-          <p:nvPr>
-            <p:ph type="ctrTitle"/>
-          </p:nvPr>
-        </p:nvSpPr>
-        <p:spPr/>
-        <p:txBody>
-          <a:bodyPr/>
-          <a:lstStyle/>
-          <a:p>
-            <a:endParaRPr lang="en-US"/>
-          </a:p>
-        </p:txBody>
-      </p:sp>
-      <p:sp>
-        <p:nvSpPr>
-          <p:cNvPr id="3" name="Subtitle 2">
-            <a:extLst>
-              <a:ext uri="{FF2B5EF4-FFF2-40B4-BE49-F238E27FC236}">
-                <a16:creationId xmlns:a16="http://schemas.microsoft.com/office/drawing/2014/main" id="{BD72169A-8319-4E7C-8BF5-11DC91C31FCB}"/>
-              </a:ext>
-            </a:extLst>
-          </p:cNvPr>
-          <p:cNvSpPr>
-            <a:spLocks noGrp="1"/>
-          </p:cNvSpPr>
-          <p:nvPr>
-            <p:ph type="subTitle" idx="1"/>
-          </p:nvPr>
-        </p:nvSpPr>
-        <p:spPr/>
-        <p:txBody>
-          <a:bodyPr/>
-          <a:lstStyle/>
-          <a:p>
-            <a:endParaRPr lang="en-US"/>
-          </a:p>
-        </p:txBody>
-      </p:sp>
-    </p:spTree>
-    <p:extLst>
-      <p:ext uri="{BB962C8B-B14F-4D97-AF65-F5344CB8AC3E}">
-        <p14:creationId xmlns:p14="http://schemas.microsoft.com/office/powerpoint/2010/main" val="3077195853"/>
-      </p:ext>
-    </p:extLst>
-  </p:cSld>
-  <p:clrMapOvr>
-    <a:masterClrMapping/>
-  </p:clrMapOvr>
-</p:sld>
-</file>
-
-<file path=ppt/slides/slide2.xml><?xml version="1.0" encoding="utf-8"?>
-<p:sld xmlns:a="http://schemas.openxmlformats.org/drawingml/2006/main" xmlns:r="http://schemas.openxmlformats.org/officeDocument/2006/relationships" xmlns:p="http://schemas.openxmlformats.org/presentationml/2006/main">
-  <p:cSld>
-    <p:spTree>
-      <p:nvGrpSpPr>
-        <p:cNvPr id="1" name=""/>
-        <p:cNvGrpSpPr/>
-        <p:nvPr/>
-      </p:nvGrpSpPr>
-      <p:grpSpPr>
-        <a:xfrm>
-          <a:off x="0" y="0"/>
-          <a:ext cx="0" cy="0"/>
-          <a:chOff x="0" y="0"/>
-          <a:chExt cx="0" cy="0"/>
-        </a:xfrm>
-      </p:grpSpPr>
       <p:pic>
         <p:nvPicPr>
           <p:cNvPr id="4" name="Picture 3" descr="A close up of a logo&#10;&#10;Description generated with high confidence">

</xml_diff>